<commit_message>
updated slides for  jquery talk
</commit_message>
<xml_diff>
--- a/Intro to Web Development Part 5 JQuerys.pptx
+++ b/Intro to Web Development Part 5 JQuerys.pptx
@@ -5,10 +5,10 @@
     <p:sldMasterId id="2147483828" r:id="rId1"/>
   </p:sldMasterIdLst>
   <p:notesMasterIdLst>
-    <p:notesMasterId r:id="rId9"/>
+    <p:notesMasterId r:id="rId10"/>
   </p:notesMasterIdLst>
   <p:handoutMasterIdLst>
-    <p:handoutMasterId r:id="rId10"/>
+    <p:handoutMasterId r:id="rId11"/>
   </p:handoutMasterIdLst>
   <p:sldIdLst>
     <p:sldId id="256" r:id="rId2"/>
@@ -17,7 +17,8 @@
     <p:sldId id="285" r:id="rId5"/>
     <p:sldId id="286" r:id="rId6"/>
     <p:sldId id="287" r:id="rId7"/>
-    <p:sldId id="288" r:id="rId8"/>
+    <p:sldId id="289" r:id="rId8"/>
+    <p:sldId id="288" r:id="rId9"/>
   </p:sldIdLst>
   <p:sldSz cx="9144000" cy="6858000" type="screen4x3"/>
   <p:notesSz cx="6858000" cy="9144000"/>
@@ -202,7 +203,7 @@
             <a:fld id="{D1D57645-FFCD-449A-BB23-5EA1509828F4}" type="datetimeFigureOut">
               <a:rPr lang="en-US" smtClean="0"/>
               <a:pPr/>
-              <a:t>7/11/2012</a:t>
+              <a:t>7/12/2012</a:t>
             </a:fld>
             <a:endParaRPr lang="en-US"/>
           </a:p>
@@ -364,7 +365,7 @@
             <a:fld id="{3DBF5F01-9883-438B-B6D0-73DBD5B9823F}" type="datetimeFigureOut">
               <a:rPr lang="en-US" smtClean="0"/>
               <a:pPr/>
-              <a:t>7/11/2012</a:t>
+              <a:t>7/12/2012</a:t>
             </a:fld>
             <a:endParaRPr lang="en-US"/>
           </a:p>
@@ -765,7 +766,7 @@
             <a:fld id="{A57BAD35-6B84-4191-B3DC-7A403A6A0CC3}" type="datetime1">
               <a:rPr lang="en-US" smtClean="0"/>
               <a:pPr/>
-              <a:t>7/11/2012</a:t>
+              <a:t>7/12/2012</a:t>
             </a:fld>
             <a:endParaRPr lang="en-US"/>
           </a:p>
@@ -1080,7 +1081,7 @@
             <a:fld id="{3A050941-FA83-4211-A590-AC0CE56A8764}" type="datetime1">
               <a:rPr lang="en-US" smtClean="0"/>
               <a:pPr/>
-              <a:t>7/11/2012</a:t>
+              <a:t>7/12/2012</a:t>
             </a:fld>
             <a:endParaRPr lang="en-US"/>
           </a:p>
@@ -1267,7 +1268,7 @@
             <a:fld id="{FEE52DFA-80C0-47DB-9BD9-1D65CB6CDA24}" type="datetime1">
               <a:rPr lang="en-US" smtClean="0"/>
               <a:pPr/>
-              <a:t>7/11/2012</a:t>
+              <a:t>7/12/2012</a:t>
             </a:fld>
             <a:endParaRPr lang="en-US"/>
           </a:p>
@@ -1444,7 +1445,7 @@
             <a:fld id="{C2F50358-D16D-4C1E-B4FA-5684242D23EC}" type="datetime1">
               <a:rPr lang="en-US" smtClean="0"/>
               <a:pPr/>
-              <a:t>7/11/2012</a:t>
+              <a:t>7/12/2012</a:t>
             </a:fld>
             <a:endParaRPr lang="en-US"/>
           </a:p>
@@ -1714,7 +1715,7 @@
             <a:fld id="{CBDDB5AB-3AEE-44CE-9007-9F1799B280DC}" type="datetime1">
               <a:rPr lang="en-US" smtClean="0"/>
               <a:pPr/>
-              <a:t>7/11/2012</a:t>
+              <a:t>7/12/2012</a:t>
             </a:fld>
             <a:endParaRPr lang="en-US"/>
           </a:p>
@@ -2184,7 +2185,7 @@
             <a:fld id="{D3203901-A8D7-4787-8A59-7548459B0167}" type="datetime1">
               <a:rPr lang="en-US" smtClean="0"/>
               <a:pPr/>
-              <a:t>7/11/2012</a:t>
+              <a:t>7/12/2012</a:t>
             </a:fld>
             <a:endParaRPr lang="en-US"/>
           </a:p>
@@ -2675,7 +2676,7 @@
             <a:fld id="{7918E94E-D541-420D-A800-FD77FBF7DA22}" type="datetime1">
               <a:rPr lang="en-US" smtClean="0"/>
               <a:pPr/>
-              <a:t>7/11/2012</a:t>
+              <a:t>7/12/2012</a:t>
             </a:fld>
             <a:endParaRPr lang="en-US"/>
           </a:p>
@@ -2803,7 +2804,7 @@
             <a:fld id="{4F6AD9DB-6294-4080-B799-E3AAD55EC433}" type="datetime1">
               <a:rPr lang="en-US" smtClean="0"/>
               <a:pPr/>
-              <a:t>7/11/2012</a:t>
+              <a:t>7/12/2012</a:t>
             </a:fld>
             <a:endParaRPr lang="en-US"/>
           </a:p>
@@ -2949,7 +2950,7 @@
             <a:fld id="{BB50B515-1A03-4B7B-9677-075026F277E2}" type="datetime1">
               <a:rPr lang="en-US" smtClean="0"/>
               <a:pPr/>
-              <a:t>7/11/2012</a:t>
+              <a:t>7/12/2012</a:t>
             </a:fld>
             <a:endParaRPr lang="en-US"/>
           </a:p>
@@ -3273,7 +3274,7 @@
             <a:fld id="{BB176034-9467-42CE-BFB4-763887316EF3}" type="datetime1">
               <a:rPr lang="en-US" smtClean="0"/>
               <a:pPr/>
-              <a:t>7/11/2012</a:t>
+              <a:t>7/12/2012</a:t>
             </a:fld>
             <a:endParaRPr lang="en-US"/>
           </a:p>
@@ -3409,7 +3410,7 @@
             <a:fld id="{49E44895-E262-425D-912F-9A1492637C2E}" type="datetime1">
               <a:rPr lang="en-US" smtClean="0"/>
               <a:pPr/>
-              <a:t>7/11/2012</a:t>
+              <a:t>7/12/2012</a:t>
             </a:fld>
             <a:endParaRPr lang="en-US"/>
           </a:p>
@@ -4192,7 +4193,7 @@
             <a:fld id="{23F403FB-53A5-4106-8144-8A9C4E2CDCDB}" type="datetime1">
               <a:rPr lang="en-US" smtClean="0"/>
               <a:pPr/>
-              <a:t>7/11/2012</a:t>
+              <a:t>7/12/2012</a:t>
             </a:fld>
             <a:endParaRPr lang="en-US"/>
           </a:p>
@@ -4835,11 +4836,6 @@
               </a:rPr>
               <a:t>JavaScript</a:t>
             </a:r>
-            <a:endParaRPr lang="en-US" dirty="0" smtClean="0">
-              <a:solidFill>
-                <a:srgbClr val="0070C0"/>
-              </a:solidFill>
-            </a:endParaRPr>
           </a:p>
           <a:p>
             <a:r>
@@ -5202,10 +5198,6 @@
               </a:rPr>
               <a:t>    alert(‘hello’);</a:t>
             </a:r>
-            <a:endParaRPr lang="en-US" dirty="0" smtClean="0">
-              <a:latin typeface="+mj-lt"/>
-              <a:cs typeface="Courier New" pitchFamily="49" charset="0"/>
-            </a:endParaRPr>
           </a:p>
           <a:p>
             <a:r>
@@ -5333,7 +5325,6 @@
               <a:rPr lang="en-US" dirty="0" smtClean="0"/>
               <a:t> – What does it offer</a:t>
             </a:r>
-            <a:endParaRPr lang="en-US" dirty="0" smtClean="0"/>
           </a:p>
           <a:p>
             <a:pPr lvl="1">
@@ -5540,7 +5531,6 @@
               <a:rPr lang="en-US" dirty="0" smtClean="0"/>
               <a:t>Leverage your CSS knowledge</a:t>
             </a:r>
-            <a:endParaRPr lang="en-US" dirty="0" smtClean="0"/>
           </a:p>
           <a:p>
             <a:r>
@@ -5555,7 +5545,6 @@
               <a:rPr lang="en-US" dirty="0" smtClean="0"/>
               <a:t>’)</a:t>
             </a:r>
-            <a:endParaRPr lang="en-US" dirty="0" smtClean="0"/>
           </a:p>
           <a:p>
             <a:r>
@@ -5576,7 +5565,6 @@
               <a:rPr lang="en-US" dirty="0" smtClean="0"/>
               <a:t>$(‘p’)</a:t>
             </a:r>
-            <a:endParaRPr lang="en-US" dirty="0" smtClean="0"/>
           </a:p>
           <a:p>
             <a:r>
@@ -5686,7 +5674,7 @@
           <a:p>
             <a:r>
               <a:rPr lang="en-US" dirty="0" smtClean="0"/>
-              <a:t>Questions</a:t>
+              <a:t>Tools for debugging	</a:t>
             </a:r>
             <a:endParaRPr lang="en-US" dirty="0"/>
           </a:p>
@@ -5707,7 +5695,43 @@
           <a:bodyPr/>
           <a:lstStyle/>
           <a:p>
-            <a:endParaRPr lang="en-US"/>
+            <a:r>
+              <a:rPr lang="en-US" dirty="0" smtClean="0"/>
+              <a:t>Firebug</a:t>
+            </a:r>
+          </a:p>
+          <a:p>
+            <a:r>
+              <a:rPr lang="en-US" dirty="0" smtClean="0"/>
+              <a:t>Chrome console</a:t>
+            </a:r>
+          </a:p>
+          <a:p>
+            <a:r>
+              <a:rPr lang="en-US" dirty="0" smtClean="0">
+                <a:hlinkClick r:id="rId2"/>
+              </a:rPr>
+              <a:t>http://www.jslint.com</a:t>
+            </a:r>
+            <a:r>
+              <a:rPr lang="en-US" dirty="0" smtClean="0">
+                <a:hlinkClick r:id="rId2"/>
+              </a:rPr>
+              <a:t>/</a:t>
+            </a:r>
+            <a:endParaRPr lang="en-US" dirty="0" smtClean="0"/>
+          </a:p>
+          <a:p>
+            <a:r>
+              <a:rPr lang="en-US" dirty="0" smtClean="0"/>
+              <a:t>Firebug</a:t>
+            </a:r>
+          </a:p>
+          <a:p>
+            <a:endParaRPr lang="en-US" dirty="0" smtClean="0"/>
+          </a:p>
+          <a:p>
+            <a:endParaRPr lang="en-US" dirty="0"/>
           </a:p>
         </p:txBody>
       </p:sp>
@@ -5730,6 +5754,97 @@
               <a:rPr lang="en-US" smtClean="0"/>
               <a:pPr/>
               <a:t>7</a:t>
+            </a:fld>
+            <a:endParaRPr lang="en-US"/>
+          </a:p>
+        </p:txBody>
+      </p:sp>
+    </p:spTree>
+  </p:cSld>
+  <p:clrMapOvr>
+    <a:masterClrMapping/>
+  </p:clrMapOvr>
+</p:sld>
+</file>
+
+<file path=ppt/slides/slide8.xml><?xml version="1.0" encoding="utf-8"?>
+<p:sld xmlns:a="http://schemas.openxmlformats.org/drawingml/2006/main" xmlns:r="http://schemas.openxmlformats.org/officeDocument/2006/relationships" xmlns:p="http://schemas.openxmlformats.org/presentationml/2006/main">
+  <p:cSld>
+    <p:spTree>
+      <p:nvGrpSpPr>
+        <p:cNvPr id="1" name=""/>
+        <p:cNvGrpSpPr/>
+        <p:nvPr/>
+      </p:nvGrpSpPr>
+      <p:grpSpPr>
+        <a:xfrm>
+          <a:off x="0" y="0"/>
+          <a:ext cx="0" cy="0"/>
+          <a:chOff x="0" y="0"/>
+          <a:chExt cx="0" cy="0"/>
+        </a:xfrm>
+      </p:grpSpPr>
+      <p:sp>
+        <p:nvSpPr>
+          <p:cNvPr id="2" name="Title 1"/>
+          <p:cNvSpPr>
+            <a:spLocks noGrp="1"/>
+          </p:cNvSpPr>
+          <p:nvPr>
+            <p:ph type="title"/>
+          </p:nvPr>
+        </p:nvSpPr>
+        <p:spPr/>
+        <p:txBody>
+          <a:bodyPr/>
+          <a:lstStyle/>
+          <a:p>
+            <a:r>
+              <a:rPr lang="en-US" dirty="0" smtClean="0"/>
+              <a:t>Questions</a:t>
+            </a:r>
+            <a:endParaRPr lang="en-US" dirty="0"/>
+          </a:p>
+        </p:txBody>
+      </p:sp>
+      <p:sp>
+        <p:nvSpPr>
+          <p:cNvPr id="3" name="Content Placeholder 2"/>
+          <p:cNvSpPr>
+            <a:spLocks noGrp="1"/>
+          </p:cNvSpPr>
+          <p:nvPr>
+            <p:ph idx="1"/>
+          </p:nvPr>
+        </p:nvSpPr>
+        <p:spPr/>
+        <p:txBody>
+          <a:bodyPr/>
+          <a:lstStyle/>
+          <a:p>
+            <a:endParaRPr lang="en-US"/>
+          </a:p>
+        </p:txBody>
+      </p:sp>
+      <p:sp>
+        <p:nvSpPr>
+          <p:cNvPr id="4" name="Slide Number Placeholder 3"/>
+          <p:cNvSpPr>
+            <a:spLocks noGrp="1"/>
+          </p:cNvSpPr>
+          <p:nvPr>
+            <p:ph type="sldNum" sz="quarter" idx="12"/>
+          </p:nvPr>
+        </p:nvSpPr>
+        <p:spPr/>
+        <p:txBody>
+          <a:bodyPr/>
+          <a:lstStyle/>
+          <a:p>
+            <a:fld id="{F0475846-4FF4-4053-A16A-5651754C44C3}" type="slidenum">
+              <a:rPr lang="en-US" smtClean="0"/>
+              <a:pPr/>
+              <a:t>8</a:t>
             </a:fld>
             <a:endParaRPr lang="en-US"/>
           </a:p>

</xml_diff>